<commit_message>
some edits on my bayesian meeting slides
</commit_message>
<xml_diff>
--- a/presentations/bayesian.pptx
+++ b/presentations/bayesian.pptx
@@ -2339,7 +2339,7 @@
           <a:p>
             <a:fld id="{A1B4F3E3-EDD5-4665-858B-5A366D1C0E91}" type="datetimeFigureOut">
               <a:rPr lang="zh-CN" altLang="en-US" smtClean="0"/>
-              <a:t>2025/10/6</a:t>
+              <a:t>2025/10/7</a:t>
             </a:fld>
             <a:endParaRPr lang="zh-CN" altLang="en-US"/>
           </a:p>
@@ -3032,7 +3032,7 @@
           <a:p>
             <a:fld id="{E382E74F-4A28-4498-B099-6C8A785339C9}" type="datetimeFigureOut">
               <a:rPr lang="zh-CN" altLang="en-US" smtClean="0"/>
-              <a:t>2025/10/6</a:t>
+              <a:t>2025/10/7</a:t>
             </a:fld>
             <a:endParaRPr lang="zh-CN" altLang="en-US"/>
           </a:p>
@@ -3232,7 +3232,7 @@
           <a:p>
             <a:fld id="{E382E74F-4A28-4498-B099-6C8A785339C9}" type="datetimeFigureOut">
               <a:rPr lang="zh-CN" altLang="en-US" smtClean="0"/>
-              <a:t>2025/10/6</a:t>
+              <a:t>2025/10/7</a:t>
             </a:fld>
             <a:endParaRPr lang="zh-CN" altLang="en-US"/>
           </a:p>
@@ -3442,7 +3442,7 @@
           <a:p>
             <a:fld id="{E382E74F-4A28-4498-B099-6C8A785339C9}" type="datetimeFigureOut">
               <a:rPr lang="zh-CN" altLang="en-US" smtClean="0"/>
-              <a:t>2025/10/6</a:t>
+              <a:t>2025/10/7</a:t>
             </a:fld>
             <a:endParaRPr lang="zh-CN" altLang="en-US"/>
           </a:p>
@@ -3642,7 +3642,7 @@
           <a:p>
             <a:fld id="{E382E74F-4A28-4498-B099-6C8A785339C9}" type="datetimeFigureOut">
               <a:rPr lang="zh-CN" altLang="en-US" smtClean="0"/>
-              <a:t>2025/10/6</a:t>
+              <a:t>2025/10/7</a:t>
             </a:fld>
             <a:endParaRPr lang="zh-CN" altLang="en-US"/>
           </a:p>
@@ -3918,7 +3918,7 @@
           <a:p>
             <a:fld id="{E382E74F-4A28-4498-B099-6C8A785339C9}" type="datetimeFigureOut">
               <a:rPr lang="zh-CN" altLang="en-US" smtClean="0"/>
-              <a:t>2025/10/6</a:t>
+              <a:t>2025/10/7</a:t>
             </a:fld>
             <a:endParaRPr lang="zh-CN" altLang="en-US"/>
           </a:p>
@@ -4186,7 +4186,7 @@
           <a:p>
             <a:fld id="{E382E74F-4A28-4498-B099-6C8A785339C9}" type="datetimeFigureOut">
               <a:rPr lang="zh-CN" altLang="en-US" smtClean="0"/>
-              <a:t>2025/10/6</a:t>
+              <a:t>2025/10/7</a:t>
             </a:fld>
             <a:endParaRPr lang="zh-CN" altLang="en-US"/>
           </a:p>
@@ -4601,7 +4601,7 @@
           <a:p>
             <a:fld id="{E382E74F-4A28-4498-B099-6C8A785339C9}" type="datetimeFigureOut">
               <a:rPr lang="zh-CN" altLang="en-US" smtClean="0"/>
-              <a:t>2025/10/6</a:t>
+              <a:t>2025/10/7</a:t>
             </a:fld>
             <a:endParaRPr lang="zh-CN" altLang="en-US"/>
           </a:p>
@@ -4743,7 +4743,7 @@
           <a:p>
             <a:fld id="{E382E74F-4A28-4498-B099-6C8A785339C9}" type="datetimeFigureOut">
               <a:rPr lang="zh-CN" altLang="en-US" smtClean="0"/>
-              <a:t>2025/10/6</a:t>
+              <a:t>2025/10/7</a:t>
             </a:fld>
             <a:endParaRPr lang="zh-CN" altLang="en-US"/>
           </a:p>
@@ -4856,7 +4856,7 @@
           <a:p>
             <a:fld id="{E382E74F-4A28-4498-B099-6C8A785339C9}" type="datetimeFigureOut">
               <a:rPr lang="zh-CN" altLang="en-US" smtClean="0"/>
-              <a:t>2025/10/6</a:t>
+              <a:t>2025/10/7</a:t>
             </a:fld>
             <a:endParaRPr lang="zh-CN" altLang="en-US"/>
           </a:p>
@@ -5169,7 +5169,7 @@
           <a:p>
             <a:fld id="{E382E74F-4A28-4498-B099-6C8A785339C9}" type="datetimeFigureOut">
               <a:rPr lang="zh-CN" altLang="en-US" smtClean="0"/>
-              <a:t>2025/10/6</a:t>
+              <a:t>2025/10/7</a:t>
             </a:fld>
             <a:endParaRPr lang="zh-CN" altLang="en-US"/>
           </a:p>
@@ -5458,7 +5458,7 @@
           <a:p>
             <a:fld id="{E382E74F-4A28-4498-B099-6C8A785339C9}" type="datetimeFigureOut">
               <a:rPr lang="zh-CN" altLang="en-US" smtClean="0"/>
-              <a:t>2025/10/6</a:t>
+              <a:t>2025/10/7</a:t>
             </a:fld>
             <a:endParaRPr lang="zh-CN" altLang="en-US"/>
           </a:p>
@@ -5701,7 +5701,7 @@
           <a:p>
             <a:fld id="{E382E74F-4A28-4498-B099-6C8A785339C9}" type="datetimeFigureOut">
               <a:rPr lang="zh-CN" altLang="en-US" smtClean="0"/>
-              <a:t>2025/10/6</a:t>
+              <a:t>2025/10/7</a:t>
             </a:fld>
             <a:endParaRPr lang="zh-CN" altLang="en-US"/>
           </a:p>
@@ -6636,7 +6636,7 @@
             </a:pPr>
             <a:r>
               <a:rPr lang="en-US" altLang="zh-CN" sz="2800" dirty="0"/>
-              <a:t>Best way to handle different levels of uncertainty or missing data across studies?</a:t>
+              <a:t>Best way to handle different levels of uncertainty or missing data across species?</a:t>
             </a:r>
           </a:p>
         </p:txBody>
@@ -6979,7 +6979,7 @@
         </p:nvSpPr>
         <p:spPr>
           <a:xfrm>
-            <a:off x="2056171" y="918334"/>
+            <a:off x="2056171" y="733668"/>
             <a:ext cx="2641600" cy="369332"/>
           </a:xfrm>
           <a:prstGeom prst="rect">
@@ -7015,7 +7015,7 @@
         </p:nvSpPr>
         <p:spPr>
           <a:xfrm>
-            <a:off x="8502908" y="918334"/>
+            <a:off x="8502908" y="733668"/>
             <a:ext cx="2641600" cy="369332"/>
           </a:xfrm>
           <a:prstGeom prst="rect">
@@ -8817,7 +8817,7 @@
         </p:nvSpPr>
         <p:spPr>
           <a:xfrm>
-            <a:off x="1214252" y="1710046"/>
+            <a:off x="2805308" y="248185"/>
             <a:ext cx="8615548" cy="1200329"/>
           </a:xfrm>
           <a:prstGeom prst="rect">
@@ -8864,10 +8864,10 @@
       </p:sp>
       <p:sp>
         <p:nvSpPr>
-          <p:cNvPr id="18" name="TextBox 17">
-            <a:extLst>
-              <a:ext uri="{FF2B5EF4-FFF2-40B4-BE49-F238E27FC236}">
-                <a16:creationId xmlns:a16="http://schemas.microsoft.com/office/drawing/2014/main" id="{BCD36027-35AA-C273-D456-19D66AE909BD}"/>
+          <p:cNvPr id="3" name="TextBox 2">
+            <a:extLst>
+              <a:ext uri="{FF2B5EF4-FFF2-40B4-BE49-F238E27FC236}">
+                <a16:creationId xmlns:a16="http://schemas.microsoft.com/office/drawing/2014/main" id="{C52021A3-D278-CD73-936F-A3ADA3B09DB0}"/>
               </a:ext>
             </a:extLst>
           </p:cNvPr>
@@ -8876,8 +8876,8 @@
         </p:nvSpPr>
         <p:spPr>
           <a:xfrm>
-            <a:off x="783772" y="4780162"/>
-            <a:ext cx="10820400" cy="1200329"/>
+            <a:off x="1056073" y="248185"/>
+            <a:ext cx="3016332" cy="830997"/>
           </a:xfrm>
           <a:prstGeom prst="rect">
             <a:avLst/>
@@ -8890,50 +8890,73 @@
           </a:bodyPr>
           <a:lstStyle/>
           <a:p>
-            <a:pPr algn="ctr"/>
-            <a:r>
-              <a:rPr lang="en-US" altLang="zh-CN" sz="2400" dirty="0"/>
-              <a:t>Which reproductive-related traits are related to masting? </a:t>
-            </a:r>
-          </a:p>
-          <a:p>
-            <a:pPr algn="ctr"/>
-            <a:r>
-              <a:rPr lang="en-US" altLang="zh-CN" sz="2400" dirty="0"/>
-              <a:t>Do these traits that relate to different masting hypotheses vary by environment?</a:t>
-            </a:r>
-          </a:p>
-          <a:p>
-            <a:pPr algn="ctr"/>
-            <a:r>
-              <a:rPr lang="en-US" altLang="zh-CN" sz="2400" dirty="0"/>
-              <a:t>(e.g., which traits are more important in different environment)</a:t>
-            </a:r>
-            <a:endParaRPr lang="zh-CN" altLang="en-US" sz="2400" dirty="0"/>
+            <a:r>
+              <a:rPr lang="en-US" altLang="zh-CN" sz="4800" b="1" dirty="0"/>
+              <a:t>BUT</a:t>
+            </a:r>
+            <a:endParaRPr lang="zh-CN" altLang="en-US" sz="4800" b="1" dirty="0"/>
           </a:p>
         </p:txBody>
       </p:sp>
-      <p:sp>
-        <p:nvSpPr>
-          <p:cNvPr id="3" name="TextBox 2">
-            <a:extLst>
-              <a:ext uri="{FF2B5EF4-FFF2-40B4-BE49-F238E27FC236}">
-                <a16:creationId xmlns:a16="http://schemas.microsoft.com/office/drawing/2014/main" id="{C52021A3-D278-CD73-936F-A3ADA3B09DB0}"/>
-              </a:ext>
-            </a:extLst>
-          </p:cNvPr>
-          <p:cNvSpPr txBox="1"/>
+      <p:pic>
+        <p:nvPicPr>
+          <p:cNvPr id="6" name="Picture 5" descr="A circular shape with different colored lines&#10;&#10;AI-generated content may be incorrect.">
+            <a:extLst>
+              <a:ext uri="{FF2B5EF4-FFF2-40B4-BE49-F238E27FC236}">
+                <a16:creationId xmlns:a16="http://schemas.microsoft.com/office/drawing/2014/main" id="{83C71936-383A-0DF6-47AE-07EF4CCE3691}"/>
+              </a:ext>
+            </a:extLst>
+          </p:cNvPr>
+          <p:cNvPicPr>
+            <a:picLocks noChangeAspect="1"/>
+          </p:cNvPicPr>
           <p:nvPr/>
-        </p:nvSpPr>
-        <p:spPr>
-          <a:xfrm>
-            <a:off x="973777" y="617517"/>
-            <a:ext cx="3016332" cy="830997"/>
+        </p:nvPicPr>
+        <p:blipFill>
+          <a:blip r:embed="rId2">
+            <a:extLst>
+              <a:ext uri="{28A0092B-C50C-407E-A947-70E740481C1C}">
+                <a14:useLocalDpi xmlns:a14="http://schemas.microsoft.com/office/drawing/2010/main" val="0"/>
+              </a:ext>
+            </a:extLst>
+          </a:blip>
+          <a:stretch>
+            <a:fillRect/>
+          </a:stretch>
+        </p:blipFill>
+        <p:spPr>
+          <a:xfrm>
+            <a:off x="1632138" y="1448514"/>
+            <a:ext cx="8696432" cy="5313680"/>
           </a:xfrm>
           <a:prstGeom prst="rect">
             <a:avLst/>
           </a:prstGeom>
-          <a:noFill/>
+        </p:spPr>
+      </p:pic>
+      <p:sp>
+        <p:nvSpPr>
+          <p:cNvPr id="7" name="TextBox 6">
+            <a:extLst>
+              <a:ext uri="{FF2B5EF4-FFF2-40B4-BE49-F238E27FC236}">
+                <a16:creationId xmlns:a16="http://schemas.microsoft.com/office/drawing/2014/main" id="{3E31D493-45CE-125C-1BE2-EFBE3C499DF3}"/>
+              </a:ext>
+            </a:extLst>
+          </p:cNvPr>
+          <p:cNvSpPr txBox="1"/>
+          <p:nvPr/>
+        </p:nvSpPr>
+        <p:spPr>
+          <a:xfrm>
+            <a:off x="600456" y="3273424"/>
+            <a:ext cx="10820400" cy="1200329"/>
+          </a:xfrm>
+          <a:prstGeom prst="rect">
+            <a:avLst/>
+          </a:prstGeom>
+          <a:solidFill>
+            <a:schemeClr val="bg1"/>
+          </a:solidFill>
         </p:spPr>
         <p:txBody>
           <a:bodyPr wrap="square" rtlCol="0">
@@ -8941,20 +8964,35 @@
           </a:bodyPr>
           <a:lstStyle/>
           <a:p>
-            <a:r>
-              <a:rPr lang="en-US" altLang="zh-CN" sz="4800" b="1" dirty="0"/>
-              <a:t>BUT</a:t>
-            </a:r>
-            <a:endParaRPr lang="zh-CN" altLang="en-US" sz="4800" b="1" dirty="0"/>
+            <a:pPr algn="ctr"/>
+            <a:r>
+              <a:rPr lang="en-US" altLang="zh-CN" sz="2400" dirty="0"/>
+              <a:t>Which reproductive-related traits are related to masting? </a:t>
+            </a:r>
+          </a:p>
+          <a:p>
+            <a:pPr algn="ctr"/>
+            <a:r>
+              <a:rPr lang="en-US" altLang="zh-CN" sz="2400" dirty="0"/>
+              <a:t>Do these traits that relate to different masting hypotheses vary by environment?</a:t>
+            </a:r>
+          </a:p>
+          <a:p>
+            <a:pPr algn="ctr"/>
+            <a:r>
+              <a:rPr lang="en-US" altLang="zh-CN" sz="2400" dirty="0"/>
+              <a:t>(e.g., which traits are more important in different environment)</a:t>
+            </a:r>
+            <a:endParaRPr lang="zh-CN" altLang="en-US" sz="2400" dirty="0"/>
           </a:p>
         </p:txBody>
       </p:sp>
       <p:sp>
         <p:nvSpPr>
-          <p:cNvPr id="4" name="TextBox 3">
-            <a:extLst>
-              <a:ext uri="{FF2B5EF4-FFF2-40B4-BE49-F238E27FC236}">
-                <a16:creationId xmlns:a16="http://schemas.microsoft.com/office/drawing/2014/main" id="{499ACE6C-3CA0-4FD0-A1B1-545BF38EBAB5}"/>
+          <p:cNvPr id="8" name="TextBox 7">
+            <a:extLst>
+              <a:ext uri="{FF2B5EF4-FFF2-40B4-BE49-F238E27FC236}">
+                <a16:creationId xmlns:a16="http://schemas.microsoft.com/office/drawing/2014/main" id="{B237F0C7-2ED5-C8E5-BA95-38ADCF19E79B}"/>
               </a:ext>
             </a:extLst>
           </p:cNvPr>
@@ -8963,13 +9001,15 @@
         </p:nvSpPr>
         <p:spPr>
           <a:xfrm>
-            <a:off x="973777" y="3786249"/>
+            <a:off x="4472188" y="2442427"/>
             <a:ext cx="3016332" cy="830997"/>
           </a:xfrm>
           <a:prstGeom prst="rect">
             <a:avLst/>
           </a:prstGeom>
-          <a:noFill/>
+          <a:solidFill>
+            <a:schemeClr val="bg1"/>
+          </a:solidFill>
         </p:spPr>
         <p:txBody>
           <a:bodyPr wrap="square" rtlCol="0">
@@ -8995,6 +9035,112 @@
   <p:clrMapOvr>
     <a:masterClrMapping/>
   </p:clrMapOvr>
+  <p:timing>
+    <p:tnLst>
+      <p:par>
+        <p:cTn id="1" dur="indefinite" restart="never" nodeType="tmRoot">
+          <p:childTnLst>
+            <p:seq concurrent="1" nextAc="seek">
+              <p:cTn id="2" dur="indefinite" nodeType="mainSeq">
+                <p:childTnLst>
+                  <p:par>
+                    <p:cTn id="3" fill="hold">
+                      <p:stCondLst>
+                        <p:cond delay="indefinite"/>
+                      </p:stCondLst>
+                      <p:childTnLst>
+                        <p:par>
+                          <p:cTn id="4" fill="hold">
+                            <p:stCondLst>
+                              <p:cond delay="0"/>
+                            </p:stCondLst>
+                            <p:childTnLst>
+                              <p:par>
+                                <p:cTn id="5" presetID="1" presetClass="entr" presetSubtype="0" fill="hold" grpId="0" nodeType="clickEffect">
+                                  <p:stCondLst>
+                                    <p:cond delay="0"/>
+                                  </p:stCondLst>
+                                  <p:childTnLst>
+                                    <p:set>
+                                      <p:cBhvr>
+                                        <p:cTn id="6" dur="1" fill="hold">
+                                          <p:stCondLst>
+                                            <p:cond delay="0"/>
+                                          </p:stCondLst>
+                                        </p:cTn>
+                                        <p:tgtEl>
+                                          <p:spTgt spid="7"/>
+                                        </p:tgtEl>
+                                        <p:attrNameLst>
+                                          <p:attrName>style.visibility</p:attrName>
+                                        </p:attrNameLst>
+                                      </p:cBhvr>
+                                      <p:to>
+                                        <p:strVal val="visible"/>
+                                      </p:to>
+                                    </p:set>
+                                  </p:childTnLst>
+                                </p:cTn>
+                              </p:par>
+                              <p:par>
+                                <p:cTn id="7" presetID="1" presetClass="entr" presetSubtype="0" fill="hold" grpId="0" nodeType="withEffect">
+                                  <p:stCondLst>
+                                    <p:cond delay="0"/>
+                                  </p:stCondLst>
+                                  <p:childTnLst>
+                                    <p:set>
+                                      <p:cBhvr>
+                                        <p:cTn id="8" dur="1" fill="hold">
+                                          <p:stCondLst>
+                                            <p:cond delay="0"/>
+                                          </p:stCondLst>
+                                        </p:cTn>
+                                        <p:tgtEl>
+                                          <p:spTgt spid="8"/>
+                                        </p:tgtEl>
+                                        <p:attrNameLst>
+                                          <p:attrName>style.visibility</p:attrName>
+                                        </p:attrNameLst>
+                                      </p:cBhvr>
+                                      <p:to>
+                                        <p:strVal val="visible"/>
+                                      </p:to>
+                                    </p:set>
+                                  </p:childTnLst>
+                                </p:cTn>
+                              </p:par>
+                            </p:childTnLst>
+                          </p:cTn>
+                        </p:par>
+                      </p:childTnLst>
+                    </p:cTn>
+                  </p:par>
+                </p:childTnLst>
+              </p:cTn>
+              <p:prevCondLst>
+                <p:cond evt="onPrev" delay="0">
+                  <p:tgtEl>
+                    <p:sldTgt/>
+                  </p:tgtEl>
+                </p:cond>
+              </p:prevCondLst>
+              <p:nextCondLst>
+                <p:cond evt="onNext" delay="0">
+                  <p:tgtEl>
+                    <p:sldTgt/>
+                  </p:tgtEl>
+                </p:cond>
+              </p:nextCondLst>
+            </p:seq>
+          </p:childTnLst>
+        </p:cTn>
+      </p:par>
+    </p:tnLst>
+    <p:bldLst>
+      <p:bldP spid="7" grpId="0" animBg="1"/>
+      <p:bldP spid="8" grpId="0" animBg="1"/>
+    </p:bldLst>
+  </p:timing>
 </p:sld>
 </file>
 
@@ -10498,8 +10644,8 @@
         </p:nvSpPr>
         <p:spPr>
           <a:xfrm>
-            <a:off x="89058" y="3827522"/>
-            <a:ext cx="1436015" cy="598369"/>
+            <a:off x="98594" y="4157825"/>
+            <a:ext cx="2937147" cy="646331"/>
           </a:xfrm>
           <a:prstGeom prst="rect">
             <a:avLst/>
@@ -10512,11 +10658,19 @@
           </a:bodyPr>
           <a:lstStyle/>
           <a:p>
-            <a:pPr fontAlgn="base">
-              <a:lnSpc>
-                <a:spcPts val="4875"/>
-              </a:lnSpc>
-            </a:pPr>
+            <a:pPr fontAlgn="base"/>
+            <a:r>
+              <a:rPr lang="en-US" altLang="zh-CN" sz="1200" dirty="0">
+                <a:solidFill>
+                  <a:srgbClr val="212529"/>
+                </a:solidFill>
+                <a:latin typeface="Playfair Display" panose="020F0502020204030204" pitchFamily="2" charset="0"/>
+              </a:rPr>
+              <a:t>(single sex flower or both sexes flowers)</a:t>
+            </a:r>
+          </a:p>
+          <a:p>
+            <a:pPr fontAlgn="base"/>
             <a:r>
               <a:rPr lang="en-US" altLang="zh-CN" sz="1200" dirty="0">
                 <a:solidFill>
@@ -10527,6 +10681,15 @@
               <a:t>(categorical)</a:t>
             </a:r>
           </a:p>
+          <a:p>
+            <a:pPr fontAlgn="base"/>
+            <a:endParaRPr lang="en-US" altLang="zh-CN" sz="1200" dirty="0">
+              <a:solidFill>
+                <a:srgbClr val="212529"/>
+              </a:solidFill>
+              <a:latin typeface="Playfair Display" panose="020F0502020204030204" pitchFamily="2" charset="0"/>
+            </a:endParaRPr>
+          </a:p>
         </p:txBody>
       </p:sp>
       <p:sp>
@@ -10588,8 +10751,8 @@
         </p:nvSpPr>
         <p:spPr>
           <a:xfrm>
-            <a:off x="82019" y="5092766"/>
-            <a:ext cx="3010757" cy="905376"/>
+            <a:off x="107940" y="5376218"/>
+            <a:ext cx="3010757" cy="461665"/>
           </a:xfrm>
           <a:prstGeom prst="rect">
             <a:avLst/>
@@ -10602,11 +10765,7 @@
           </a:bodyPr>
           <a:lstStyle/>
           <a:p>
-            <a:pPr fontAlgn="base">
-              <a:lnSpc>
-                <a:spcPts val="4875"/>
-              </a:lnSpc>
-            </a:pPr>
+            <a:pPr fontAlgn="base"/>
             <a:r>
               <a:rPr lang="en-US" altLang="zh-CN" sz="1200" dirty="0">
                 <a:solidFill>
@@ -10645,8 +10804,8 @@
         </p:nvSpPr>
         <p:spPr>
           <a:xfrm>
-            <a:off x="3619698" y="4038786"/>
-            <a:ext cx="1436015" cy="598369"/>
+            <a:off x="3629234" y="4339326"/>
+            <a:ext cx="2191562" cy="461665"/>
           </a:xfrm>
           <a:prstGeom prst="rect">
             <a:avLst/>
@@ -10659,11 +10818,19 @@
           </a:bodyPr>
           <a:lstStyle/>
           <a:p>
-            <a:pPr fontAlgn="base">
-              <a:lnSpc>
-                <a:spcPts val="4875"/>
-              </a:lnSpc>
-            </a:pPr>
+            <a:pPr fontAlgn="base"/>
+            <a:r>
+              <a:rPr lang="en-US" altLang="zh-CN" sz="1200" dirty="0">
+                <a:solidFill>
+                  <a:srgbClr val="212529"/>
+                </a:solidFill>
+                <a:latin typeface="Playfair Display" panose="020F0502020204030204" pitchFamily="2" charset="0"/>
+              </a:rPr>
+              <a:t>(how long do leaves persist)</a:t>
+            </a:r>
+          </a:p>
+          <a:p>
+            <a:pPr fontAlgn="base"/>
             <a:r>
               <a:rPr lang="en-US" altLang="zh-CN" sz="1200" dirty="0">
                 <a:solidFill>
@@ -10825,8 +10992,8 @@
         </p:nvSpPr>
         <p:spPr>
           <a:xfrm>
-            <a:off x="6578498" y="4426757"/>
-            <a:ext cx="1436015" cy="598369"/>
+            <a:off x="6561542" y="4703060"/>
+            <a:ext cx="2059502" cy="461665"/>
           </a:xfrm>
           <a:prstGeom prst="rect">
             <a:avLst/>
@@ -10839,11 +11006,19 @@
           </a:bodyPr>
           <a:lstStyle/>
           <a:p>
-            <a:pPr fontAlgn="base">
-              <a:lnSpc>
-                <a:spcPts val="4875"/>
-              </a:lnSpc>
-            </a:pPr>
+            <a:pPr fontAlgn="base"/>
+            <a:r>
+              <a:rPr lang="en-US" altLang="zh-CN" sz="1200" dirty="0">
+                <a:solidFill>
+                  <a:srgbClr val="212529"/>
+                </a:solidFill>
+                <a:latin typeface="Playfair Display" panose="020F0502020204030204" pitchFamily="2" charset="0"/>
+              </a:rPr>
+              <a:t>(main seed disperser)</a:t>
+            </a:r>
+          </a:p>
+          <a:p>
+            <a:pPr fontAlgn="base"/>
             <a:r>
               <a:rPr lang="en-US" altLang="zh-CN" sz="1200" dirty="0">
                 <a:solidFill>
@@ -10870,8 +11045,8 @@
         </p:nvSpPr>
         <p:spPr>
           <a:xfrm>
-            <a:off x="6576341" y="5055337"/>
-            <a:ext cx="1436015" cy="598369"/>
+            <a:off x="6561542" y="5320903"/>
+            <a:ext cx="2526508" cy="461665"/>
           </a:xfrm>
           <a:prstGeom prst="rect">
             <a:avLst/>
@@ -10884,11 +11059,19 @@
           </a:bodyPr>
           <a:lstStyle/>
           <a:p>
-            <a:pPr fontAlgn="base">
-              <a:lnSpc>
-                <a:spcPts val="4875"/>
-              </a:lnSpc>
-            </a:pPr>
+            <a:pPr fontAlgn="base"/>
+            <a:r>
+              <a:rPr lang="en-US" altLang="zh-CN" sz="1200" dirty="0">
+                <a:solidFill>
+                  <a:srgbClr val="212529"/>
+                </a:solidFill>
+                <a:latin typeface="Playfair Display" panose="020F0502020204030204" pitchFamily="2" charset="0"/>
+              </a:rPr>
+              <a:t>(germinate right after)</a:t>
+            </a:r>
+          </a:p>
+          <a:p>
+            <a:pPr fontAlgn="base"/>
             <a:r>
               <a:rPr lang="en-US" altLang="zh-CN" sz="1200" dirty="0">
                 <a:solidFill>
@@ -11243,6 +11426,162 @@
   <p:clrMapOvr>
     <a:masterClrMapping/>
   </p:clrMapOvr>
+  <p:timing>
+    <p:tnLst>
+      <p:par>
+        <p:cTn id="1" dur="indefinite" restart="never" nodeType="tmRoot">
+          <p:childTnLst>
+            <p:seq concurrent="1" nextAc="seek">
+              <p:cTn id="2" dur="indefinite" nodeType="mainSeq">
+                <p:childTnLst>
+                  <p:par>
+                    <p:cTn id="3" fill="hold">
+                      <p:stCondLst>
+                        <p:cond delay="indefinite"/>
+                      </p:stCondLst>
+                      <p:childTnLst>
+                        <p:par>
+                          <p:cTn id="4" fill="hold">
+                            <p:stCondLst>
+                              <p:cond delay="0"/>
+                            </p:stCondLst>
+                            <p:childTnLst>
+                              <p:par>
+                                <p:cTn id="5" presetID="1" presetClass="entr" presetSubtype="0" fill="hold" nodeType="clickEffect">
+                                  <p:stCondLst>
+                                    <p:cond delay="0"/>
+                                  </p:stCondLst>
+                                  <p:childTnLst>
+                                    <p:set>
+                                      <p:cBhvr>
+                                        <p:cTn id="6" dur="1" fill="hold">
+                                          <p:stCondLst>
+                                            <p:cond delay="0"/>
+                                          </p:stCondLst>
+                                        </p:cTn>
+                                        <p:tgtEl>
+                                          <p:spTgt spid="3"/>
+                                        </p:tgtEl>
+                                        <p:attrNameLst>
+                                          <p:attrName>style.visibility</p:attrName>
+                                        </p:attrNameLst>
+                                      </p:cBhvr>
+                                      <p:to>
+                                        <p:strVal val="visible"/>
+                                      </p:to>
+                                    </p:set>
+                                  </p:childTnLst>
+                                </p:cTn>
+                              </p:par>
+                              <p:par>
+                                <p:cTn id="7" presetID="1" presetClass="entr" presetSubtype="0" fill="hold" nodeType="withEffect">
+                                  <p:stCondLst>
+                                    <p:cond delay="0"/>
+                                  </p:stCondLst>
+                                  <p:childTnLst>
+                                    <p:set>
+                                      <p:cBhvr>
+                                        <p:cTn id="8" dur="1" fill="hold">
+                                          <p:stCondLst>
+                                            <p:cond delay="0"/>
+                                          </p:stCondLst>
+                                        </p:cTn>
+                                        <p:tgtEl>
+                                          <p:spTgt spid="5"/>
+                                        </p:tgtEl>
+                                        <p:attrNameLst>
+                                          <p:attrName>style.visibility</p:attrName>
+                                        </p:attrNameLst>
+                                      </p:cBhvr>
+                                      <p:to>
+                                        <p:strVal val="visible"/>
+                                      </p:to>
+                                    </p:set>
+                                  </p:childTnLst>
+                                </p:cTn>
+                              </p:par>
+                              <p:par>
+                                <p:cTn id="9" presetID="1" presetClass="entr" presetSubtype="0" fill="hold" nodeType="withEffect">
+                                  <p:stCondLst>
+                                    <p:cond delay="0"/>
+                                  </p:stCondLst>
+                                  <p:childTnLst>
+                                    <p:set>
+                                      <p:cBhvr>
+                                        <p:cTn id="10" dur="1" fill="hold">
+                                          <p:stCondLst>
+                                            <p:cond delay="0"/>
+                                          </p:stCondLst>
+                                        </p:cTn>
+                                        <p:tgtEl>
+                                          <p:spTgt spid="7"/>
+                                        </p:tgtEl>
+                                        <p:attrNameLst>
+                                          <p:attrName>style.visibility</p:attrName>
+                                        </p:attrNameLst>
+                                      </p:cBhvr>
+                                      <p:to>
+                                        <p:strVal val="visible"/>
+                                      </p:to>
+                                    </p:set>
+                                  </p:childTnLst>
+                                </p:cTn>
+                              </p:par>
+                              <p:par>
+                                <p:cTn id="11" presetID="1" presetClass="entr" presetSubtype="0" fill="hold" nodeType="withEffect">
+                                  <p:stCondLst>
+                                    <p:cond delay="0"/>
+                                  </p:stCondLst>
+                                  <p:childTnLst>
+                                    <p:set>
+                                      <p:cBhvr>
+                                        <p:cTn id="12" dur="1" fill="hold">
+                                          <p:stCondLst>
+                                            <p:cond delay="0"/>
+                                          </p:stCondLst>
+                                        </p:cTn>
+                                        <p:tgtEl>
+                                          <p:spTgt spid="9"/>
+                                        </p:tgtEl>
+                                        <p:attrNameLst>
+                                          <p:attrName>style.visibility</p:attrName>
+                                        </p:attrNameLst>
+                                      </p:cBhvr>
+                                      <p:to>
+                                        <p:strVal val="visible"/>
+                                      </p:to>
+                                    </p:set>
+                                  </p:childTnLst>
+                                </p:cTn>
+                              </p:par>
+                            </p:childTnLst>
+                          </p:cTn>
+                        </p:par>
+                      </p:childTnLst>
+                    </p:cTn>
+                  </p:par>
+                </p:childTnLst>
+              </p:cTn>
+              <p:prevCondLst>
+                <p:cond evt="onPrev" delay="0">
+                  <p:tgtEl>
+                    <p:sldTgt/>
+                  </p:tgtEl>
+                </p:cond>
+              </p:prevCondLst>
+              <p:nextCondLst>
+                <p:cond evt="onNext" delay="0">
+                  <p:tgtEl>
+                    <p:sldTgt/>
+                  </p:tgtEl>
+                </p:cond>
+              </p:nextCondLst>
+            </p:seq>
+          </p:childTnLst>
+        </p:cTn>
+      </p:par>
+    </p:tnLst>
+  </p:timing>
 </p:sld>
 </file>
 

</xml_diff>